<commit_message>
fifth sem done + started sixth semester
</commit_message>
<xml_diff>
--- a/3rd-Grade/Fifth-Semester/Курсовые 5 семестр/Московка_АА_Презентация.pptx
+++ b/3rd-Grade/Fifth-Semester/Курсовые 5 семестр/Московка_АА_Презентация.pptx
@@ -11,8 +11,8 @@
     <p:sldId id="263" r:id="rId5"/>
     <p:sldId id="266" r:id="rId6"/>
     <p:sldId id="267" r:id="rId7"/>
-    <p:sldId id="268" r:id="rId8"/>
-    <p:sldId id="269" r:id="rId9"/>
+    <p:sldId id="269" r:id="rId8"/>
+    <p:sldId id="268" r:id="rId9"/>
     <p:sldId id="270" r:id="rId10"/>
     <p:sldId id="272" r:id="rId11"/>
     <p:sldId id="259" r:id="rId12"/>
@@ -349,7 +349,7 @@
           <a:p>
             <a:fld id="{48A87A34-81AB-432B-8DAE-1953F412C126}" type="datetimeFigureOut">
               <a:rPr lang="en-US" smtClean="0"/>
-              <a:t>11/22/2021</a:t>
+              <a:t>12/26/2021</a:t>
             </a:fld>
             <a:endParaRPr lang="en-US" dirty="0"/>
           </a:p>
@@ -557,7 +557,7 @@
           <a:p>
             <a:fld id="{48A87A34-81AB-432B-8DAE-1953F412C126}" type="datetimeFigureOut">
               <a:rPr lang="en-US" smtClean="0"/>
-              <a:t>11/22/2021</a:t>
+              <a:t>12/26/2021</a:t>
             </a:fld>
             <a:endParaRPr lang="en-US" dirty="0"/>
           </a:p>
@@ -813,7 +813,7 @@
           <a:p>
             <a:fld id="{48A87A34-81AB-432B-8DAE-1953F412C126}" type="datetimeFigureOut">
               <a:rPr lang="en-US" smtClean="0"/>
-              <a:t>11/22/2021</a:t>
+              <a:t>12/26/2021</a:t>
             </a:fld>
             <a:endParaRPr lang="en-US" dirty="0"/>
           </a:p>
@@ -987,7 +987,7 @@
           <a:p>
             <a:fld id="{48A87A34-81AB-432B-8DAE-1953F412C126}" type="datetimeFigureOut">
               <a:rPr lang="en-US" smtClean="0"/>
-              <a:t>11/22/2021</a:t>
+              <a:t>12/26/2021</a:t>
             </a:fld>
             <a:endParaRPr lang="en-US" dirty="0"/>
           </a:p>
@@ -1330,7 +1330,7 @@
           <a:p>
             <a:fld id="{48A87A34-81AB-432B-8DAE-1953F412C126}" type="datetimeFigureOut">
               <a:rPr lang="en-US" smtClean="0"/>
-              <a:t>11/22/2021</a:t>
+              <a:t>12/26/2021</a:t>
             </a:fld>
             <a:endParaRPr lang="en-US" dirty="0"/>
           </a:p>
@@ -1605,7 +1605,7 @@
           <a:p>
             <a:fld id="{48A87A34-81AB-432B-8DAE-1953F412C126}" type="datetimeFigureOut">
               <a:rPr lang="en-US" smtClean="0"/>
-              <a:t>11/22/2021</a:t>
+              <a:t>12/26/2021</a:t>
             </a:fld>
             <a:endParaRPr lang="en-US" dirty="0"/>
           </a:p>
@@ -1984,7 +1984,7 @@
           <a:p>
             <a:fld id="{48A87A34-81AB-432B-8DAE-1953F412C126}" type="datetimeFigureOut">
               <a:rPr lang="en-US" smtClean="0"/>
-              <a:t>11/22/2021</a:t>
+              <a:t>12/26/2021</a:t>
             </a:fld>
             <a:endParaRPr lang="en-US" dirty="0"/>
           </a:p>
@@ -2102,7 +2102,7 @@
           <a:p>
             <a:fld id="{48A87A34-81AB-432B-8DAE-1953F412C126}" type="datetimeFigureOut">
               <a:rPr lang="en-US" smtClean="0"/>
-              <a:t>11/22/2021</a:t>
+              <a:t>12/26/2021</a:t>
             </a:fld>
             <a:endParaRPr lang="en-US" dirty="0"/>
           </a:p>
@@ -2273,7 +2273,7 @@
           <a:p>
             <a:fld id="{48A87A34-81AB-432B-8DAE-1953F412C126}" type="datetimeFigureOut">
               <a:rPr lang="en-US" smtClean="0"/>
-              <a:t>11/22/2021</a:t>
+              <a:t>12/26/2021</a:t>
             </a:fld>
             <a:endParaRPr lang="en-US" dirty="0"/>
           </a:p>
@@ -2627,7 +2627,7 @@
           <a:p>
             <a:fld id="{48A87A34-81AB-432B-8DAE-1953F412C126}" type="datetimeFigureOut">
               <a:rPr lang="en-US" smtClean="0"/>
-              <a:t>11/22/2021</a:t>
+              <a:t>12/26/2021</a:t>
             </a:fld>
             <a:endParaRPr lang="en-US" dirty="0"/>
           </a:p>
@@ -3009,7 +3009,7 @@
           <a:p>
             <a:fld id="{48A87A34-81AB-432B-8DAE-1953F412C126}" type="datetimeFigureOut">
               <a:rPr lang="en-US" smtClean="0"/>
-              <a:t>11/22/2021</a:t>
+              <a:t>12/26/2021</a:t>
             </a:fld>
             <a:endParaRPr lang="en-US" dirty="0"/>
           </a:p>
@@ -3297,7 +3297,7 @@
             <a:fld id="{48A87A34-81AB-432B-8DAE-1953F412C126}" type="datetimeFigureOut">
               <a:rPr lang="en-US" smtClean="0"/>
               <a:pPr/>
-              <a:t>11/22/2021</a:t>
+              <a:t>12/26/2021</a:t>
             </a:fld>
             <a:endParaRPr lang="en-US" dirty="0"/>
           </a:p>
@@ -5689,10 +5689,10 @@
       </p:grpSpPr>
       <p:sp>
         <p:nvSpPr>
-          <p:cNvPr id="2" name="Прямоугольник 1">
+          <p:cNvPr id="3" name="Прямоугольник 2">
             <a:extLst>
               <a:ext uri="{FF2B5EF4-FFF2-40B4-BE49-F238E27FC236}">
-                <a16:creationId xmlns:a16="http://schemas.microsoft.com/office/drawing/2014/main" id="{C1DBA0B5-9AA6-4D07-97F1-40FE67F23A2A}"/>
+                <a16:creationId xmlns:a16="http://schemas.microsoft.com/office/drawing/2014/main" id="{0607F79B-E9C9-4988-B9FA-EB7AA6276304}"/>
               </a:ext>
             </a:extLst>
           </p:cNvPr>
@@ -5701,8 +5701,8 @@
         </p:nvSpPr>
         <p:spPr>
           <a:xfrm>
-            <a:off x="3506988" y="239877"/>
-            <a:ext cx="5585183" cy="584775"/>
+            <a:off x="2683848" y="239875"/>
+            <a:ext cx="6824304" cy="584775"/>
           </a:xfrm>
           <a:prstGeom prst="rect">
             <a:avLst/>
@@ -5716,7 +5716,7 @@
           <a:p>
             <a:r>
               <a:rPr lang="ru-RU" sz="3200" dirty="0"/>
-              <a:t>Окно выбора версии файла</a:t>
+              <a:t>Окно авторизации и регистрации</a:t>
             </a:r>
             <a:endParaRPr lang="en-US" sz="3200" dirty="0"/>
           </a:p>
@@ -5724,10 +5724,10 @@
       </p:sp>
       <p:pic>
         <p:nvPicPr>
-          <p:cNvPr id="3074" name="Picture 2" descr="https://cdn.discordapp.com/attachments/912348055511113748/912356330365403196/unknown.png">
+          <p:cNvPr id="2050" name="Picture 2" descr="https://cdn.discordapp.com/attachments/912348055511113748/912356113578614804/unknown.png">
             <a:extLst>
               <a:ext uri="{FF2B5EF4-FFF2-40B4-BE49-F238E27FC236}">
-                <a16:creationId xmlns:a16="http://schemas.microsoft.com/office/drawing/2014/main" id="{A9B1477B-271C-4B47-9BCC-C7BEA28E6B05}"/>
+                <a16:creationId xmlns:a16="http://schemas.microsoft.com/office/drawing/2014/main" id="{348FD6B7-3D54-43AB-965C-BE8E16723556}"/>
               </a:ext>
             </a:extLst>
           </p:cNvPr>
@@ -5751,8 +5751,8 @@
         </p:blipFill>
         <p:spPr bwMode="auto">
           <a:xfrm>
-            <a:off x="838200" y="2493139"/>
-            <a:ext cx="10515600" cy="1871722"/>
+            <a:off x="1134893" y="1971675"/>
+            <a:ext cx="9922213" cy="2914650"/>
           </a:xfrm>
           <a:prstGeom prst="rect">
             <a:avLst/>
@@ -5777,7 +5777,7 @@
     </p:spTree>
     <p:extLst>
       <p:ext uri="{BB962C8B-B14F-4D97-AF65-F5344CB8AC3E}">
-        <p14:creationId xmlns:p14="http://schemas.microsoft.com/office/powerpoint/2010/main" val="1936979492"/>
+        <p14:creationId xmlns:p14="http://schemas.microsoft.com/office/powerpoint/2010/main" val="4097587567"/>
       </p:ext>
     </p:extLst>
   </p:cSld>
@@ -5818,10 +5818,10 @@
       </p:grpSpPr>
       <p:sp>
         <p:nvSpPr>
-          <p:cNvPr id="3" name="Прямоугольник 2">
+          <p:cNvPr id="2" name="Прямоугольник 1">
             <a:extLst>
               <a:ext uri="{FF2B5EF4-FFF2-40B4-BE49-F238E27FC236}">
-                <a16:creationId xmlns:a16="http://schemas.microsoft.com/office/drawing/2014/main" id="{0607F79B-E9C9-4988-B9FA-EB7AA6276304}"/>
+                <a16:creationId xmlns:a16="http://schemas.microsoft.com/office/drawing/2014/main" id="{C1DBA0B5-9AA6-4D07-97F1-40FE67F23A2A}"/>
               </a:ext>
             </a:extLst>
           </p:cNvPr>
@@ -5830,8 +5830,8 @@
         </p:nvSpPr>
         <p:spPr>
           <a:xfrm>
-            <a:off x="2683848" y="239875"/>
-            <a:ext cx="6824304" cy="584775"/>
+            <a:off x="3506988" y="239877"/>
+            <a:ext cx="5585183" cy="584775"/>
           </a:xfrm>
           <a:prstGeom prst="rect">
             <a:avLst/>
@@ -5845,7 +5845,7 @@
           <a:p>
             <a:r>
               <a:rPr lang="ru-RU" sz="3200" dirty="0"/>
-              <a:t>Окно авторизации и регистрации</a:t>
+              <a:t>Окно выбора версии файла</a:t>
             </a:r>
             <a:endParaRPr lang="en-US" sz="3200" dirty="0"/>
           </a:p>
@@ -5853,10 +5853,10 @@
       </p:sp>
       <p:pic>
         <p:nvPicPr>
-          <p:cNvPr id="2050" name="Picture 2" descr="https://cdn.discordapp.com/attachments/912348055511113748/912356113578614804/unknown.png">
+          <p:cNvPr id="3074" name="Picture 2" descr="https://cdn.discordapp.com/attachments/912348055511113748/912356330365403196/unknown.png">
             <a:extLst>
               <a:ext uri="{FF2B5EF4-FFF2-40B4-BE49-F238E27FC236}">
-                <a16:creationId xmlns:a16="http://schemas.microsoft.com/office/drawing/2014/main" id="{348FD6B7-3D54-43AB-965C-BE8E16723556}"/>
+                <a16:creationId xmlns:a16="http://schemas.microsoft.com/office/drawing/2014/main" id="{A9B1477B-271C-4B47-9BCC-C7BEA28E6B05}"/>
               </a:ext>
             </a:extLst>
           </p:cNvPr>
@@ -5880,8 +5880,8 @@
         </p:blipFill>
         <p:spPr bwMode="auto">
           <a:xfrm>
-            <a:off x="1134893" y="1971675"/>
-            <a:ext cx="9922213" cy="2914650"/>
+            <a:off x="838200" y="2493139"/>
+            <a:ext cx="10515600" cy="1871722"/>
           </a:xfrm>
           <a:prstGeom prst="rect">
             <a:avLst/>
@@ -5906,7 +5906,7 @@
     </p:spTree>
     <p:extLst>
       <p:ext uri="{BB962C8B-B14F-4D97-AF65-F5344CB8AC3E}">
-        <p14:creationId xmlns:p14="http://schemas.microsoft.com/office/powerpoint/2010/main" val="4097587567"/>
+        <p14:creationId xmlns:p14="http://schemas.microsoft.com/office/powerpoint/2010/main" val="1936979492"/>
       </p:ext>
     </p:extLst>
   </p:cSld>

</xml_diff>